<commit_message>
Slide revision request(Windows Azure to Microsoft Azure)
Changed Windows Azure to Microsoft Azure in designated slides
</commit_message>
<xml_diff>
--- a/02.Setting up the Environments/02.Setting up the Environments.pptx
+++ b/02.Setting up the Environments/02.Setting up the Environments.pptx
@@ -404,7 +404,7 @@
           <a:p>
             <a:fld id="{DE219B1A-AE41-483B-A766-69B9363DDA6A}" type="datetimeFigureOut">
               <a:rPr lang="en-US" smtClean="0"/>
-              <a:t>10/24/2014</a:t>
+              <a:t>3/26/2015</a:t>
             </a:fld>
             <a:endParaRPr lang="en-US"/>
           </a:p>
@@ -686,7 +686,7 @@
           <a:p>
             <a:fld id="{D51B1278-D92B-4AF3-A9C1-71DD298190CE}" type="datetimeFigureOut">
               <a:rPr lang="en-US" smtClean="0"/>
-              <a:t>10/24/2014</a:t>
+              <a:t>3/26/2015</a:t>
             </a:fld>
             <a:endParaRPr lang="en-US"/>
           </a:p>
@@ -1281,7 +1281,7 @@
           <a:p>
             <a:fld id="{4F0210BE-2A39-4D0E-9359-F64D4B884D4E}" type="datetime1">
               <a:rPr lang="en-US" smtClean="0"/>
-              <a:t>10/24/2014</a:t>
+              <a:t>3/26/2015</a:t>
             </a:fld>
             <a:endParaRPr lang="en-US"/>
           </a:p>
@@ -1491,7 +1491,7 @@
           <a:p>
             <a:fld id="{CA454356-7988-4E39-B534-EC35F7CCC11C}" type="datetime1">
               <a:rPr lang="en-US" smtClean="0"/>
-              <a:t>10/24/2014</a:t>
+              <a:t>3/26/2015</a:t>
             </a:fld>
             <a:endParaRPr lang="en-US"/>
           </a:p>
@@ -1697,7 +1697,7 @@
           <a:p>
             <a:fld id="{1B816852-F550-4F1E-AE22-5580BB5390CD}" type="datetime1">
               <a:rPr lang="en-US" smtClean="0"/>
-              <a:t>10/24/2014</a:t>
+              <a:t>3/26/2015</a:t>
             </a:fld>
             <a:endParaRPr lang="en-US"/>
           </a:p>
@@ -1907,7 +1907,7 @@
           <a:p>
             <a:fld id="{8C3D3F17-9065-4B2A-80EA-09A3A0159250}" type="datetime1">
               <a:rPr lang="en-US" smtClean="0"/>
-              <a:t>10/24/2014</a:t>
+              <a:t>3/26/2015</a:t>
             </a:fld>
             <a:endParaRPr lang="en-US"/>
           </a:p>
@@ -2224,7 +2224,7 @@
           <a:p>
             <a:fld id="{E94FB22D-AF06-49F0-ABFB-4A3B32E04FBE}" type="datetime1">
               <a:rPr lang="en-US" smtClean="0"/>
-              <a:t>10/24/2014</a:t>
+              <a:t>3/26/2015</a:t>
             </a:fld>
             <a:endParaRPr lang="en-US"/>
           </a:p>
@@ -2331,7 +2331,7 @@
           <a:p>
             <a:fld id="{35A2105E-80AA-4B38-BA9C-D7E35197D8BA}" type="datetime1">
               <a:rPr lang="en-US" smtClean="0"/>
-              <a:t>10/24/2014</a:t>
+              <a:t>3/26/2015</a:t>
             </a:fld>
             <a:endParaRPr lang="en-US"/>
           </a:p>
@@ -2537,7 +2537,7 @@
           <a:p>
             <a:fld id="{C5A2A3EB-BE87-4080-97A4-5341D2051EE4}" type="datetime1">
               <a:rPr lang="en-US" smtClean="0"/>
-              <a:t>10/24/2014</a:t>
+              <a:t>3/26/2015</a:t>
             </a:fld>
             <a:endParaRPr lang="en-US"/>
           </a:p>
@@ -2894,7 +2894,7 @@
           <a:p>
             <a:fld id="{B079C3B8-7366-4A44-A34B-3977080C19E7}" type="datetime1">
               <a:rPr lang="en-US" smtClean="0"/>
-              <a:t>10/24/2014</a:t>
+              <a:t>3/26/2015</a:t>
             </a:fld>
             <a:endParaRPr lang="en-US" dirty="0"/>
           </a:p>
@@ -3136,7 +3136,7 @@
           <a:p>
             <a:fld id="{0BB6559B-C68D-49B4-97AE-9BB74C417927}" type="datetime1">
               <a:rPr lang="en-US" smtClean="0"/>
-              <a:t>10/24/2014</a:t>
+              <a:t>3/26/2015</a:t>
             </a:fld>
             <a:endParaRPr lang="en-US"/>
           </a:p>
@@ -3394,7 +3394,7 @@
           <a:p>
             <a:fld id="{B079C3B8-7366-4A44-A34B-3977080C19E7}" type="datetime1">
               <a:rPr lang="en-US" smtClean="0"/>
-              <a:t>10/24/2014</a:t>
+              <a:t>3/26/2015</a:t>
             </a:fld>
             <a:endParaRPr lang="en-US" dirty="0"/>
           </a:p>
@@ -3525,7 +3525,7 @@
           <a:p>
             <a:fld id="{9A443B04-064F-4871-9D9F-BDCA414B0371}" type="datetime1">
               <a:rPr lang="en-US" smtClean="0"/>
-              <a:t>10/24/2014</a:t>
+              <a:t>3/26/2015</a:t>
             </a:fld>
             <a:endParaRPr lang="en-US"/>
           </a:p>
@@ -3762,7 +3762,7 @@
           <a:p>
             <a:fld id="{7017412A-FAE9-499A-B3C7-924D02AB998D}" type="datetime1">
               <a:rPr lang="en-US" smtClean="0"/>
-              <a:t>10/24/2014</a:t>
+              <a:t>3/26/2015</a:t>
             </a:fld>
             <a:endParaRPr lang="en-US"/>
           </a:p>
@@ -3974,7 +3974,7 @@
           <a:p>
             <a:fld id="{4692986F-2699-409F-8A21-4F1A3E24BE62}" type="datetime1">
               <a:rPr lang="en-US" smtClean="0"/>
-              <a:t>10/24/2014</a:t>
+              <a:t>3/26/2015</a:t>
             </a:fld>
             <a:endParaRPr lang="en-US"/>
           </a:p>
@@ -4206,7 +4206,7 @@
           <a:p>
             <a:fld id="{EC07A5DE-1429-409E-95F7-F13CDA16C6E2}" type="datetime1">
               <a:rPr lang="en-US" smtClean="0"/>
-              <a:t>10/24/2014</a:t>
+              <a:t>3/26/2015</a:t>
             </a:fld>
             <a:endParaRPr lang="en-US"/>
           </a:p>
@@ -4430,7 +4430,7 @@
           <a:p>
             <a:fld id="{BBA7F52A-B8F7-43B0-8B42-741D53CB577A}" type="datetime1">
               <a:rPr lang="en-US" smtClean="0"/>
-              <a:t>10/24/2014</a:t>
+              <a:t>3/26/2015</a:t>
             </a:fld>
             <a:endParaRPr lang="en-US"/>
           </a:p>
@@ -4646,7 +4646,7 @@
           <a:p>
             <a:fld id="{4B1490A0-601F-404D-B7DA-4F4F3A8C8BB1}" type="datetime1">
               <a:rPr lang="en-US" smtClean="0"/>
-              <a:t>10/24/2014</a:t>
+              <a:t>3/26/2015</a:t>
             </a:fld>
             <a:endParaRPr lang="en-US"/>
           </a:p>
@@ -19496,7 +19496,7 @@
               </a:ln>
               <a:extLst>
                 <a:ext uri="{91240B29-F687-4f45-9708-019B960494DF}">
-                  <a14:hiddenLine xmlns="" xmlns:a14="http://schemas.microsoft.com/office/drawing/2010/main" w="9525">
+                  <a14:hiddenLine xmlns:a14="http://schemas.microsoft.com/office/drawing/2010/main" xmlns="" w="9525">
                     <a:solidFill>
                       <a:srgbClr val="000000"/>
                     </a:solidFill>
@@ -22301,7 +22301,7 @@
                 </a:ln>
                 <a:extLst>
                   <a:ext uri="{91240B29-F687-4f45-9708-019B960494DF}">
-                    <a14:hiddenLine xmlns="" xmlns:a14="http://schemas.microsoft.com/office/drawing/2010/main" w="9525">
+                    <a14:hiddenLine xmlns:a14="http://schemas.microsoft.com/office/drawing/2010/main" xmlns="" w="9525">
                       <a:solidFill>
                         <a:srgbClr val="000000"/>
                       </a:solidFill>
@@ -26682,9 +26682,9 @@
         </p:nvGrpSpPr>
         <p:grpSpPr>
           <a:xfrm>
-            <a:off x="8071017" y="1206038"/>
+            <a:off x="8071017" y="1238315"/>
             <a:ext cx="3812267" cy="5330841"/>
-            <a:chOff x="8071812" y="1144014"/>
+            <a:chOff x="8071812" y="1176303"/>
             <a:chExt cx="3813801" cy="5332986"/>
           </a:xfrm>
         </p:grpSpPr>
@@ -26696,9 +26696,9 @@
           </p:nvGrpSpPr>
           <p:grpSpPr>
             <a:xfrm>
-              <a:off x="8071812" y="1144014"/>
+              <a:off x="8071812" y="1176303"/>
               <a:ext cx="3813801" cy="5332986"/>
-              <a:chOff x="8071812" y="1188258"/>
+              <a:chOff x="8071812" y="1220817"/>
               <a:chExt cx="3813801" cy="5377786"/>
             </a:xfrm>
           </p:grpSpPr>
@@ -26710,7 +26710,7 @@
             </p:nvSpPr>
             <p:spPr bwMode="auto">
               <a:xfrm>
-                <a:off x="8071812" y="1188258"/>
+                <a:off x="8071812" y="1220817"/>
                 <a:ext cx="3813801" cy="5377786"/>
               </a:xfrm>
               <a:prstGeom prst="rect">
@@ -27339,7 +27339,7 @@
                 </a:ln>
                 <a:extLst>
                   <a:ext uri="{91240B29-F687-4f45-9708-019B960494DF}">
-                    <a14:hiddenLine xmlns="" xmlns:a14="http://schemas.microsoft.com/office/drawing/2010/main" w="9525">
+                    <a14:hiddenLine xmlns:a14="http://schemas.microsoft.com/office/drawing/2010/main" xmlns="" w="9525">
                       <a:solidFill>
                         <a:srgbClr val="000000"/>
                       </a:solidFill>
@@ -27930,7 +27930,7 @@
                 </a:ln>
                 <a:extLst>
                   <a:ext uri="{91240B29-F687-4f45-9708-019B960494DF}">
-                    <a14:hiddenLine xmlns="" xmlns:a14="http://schemas.microsoft.com/office/drawing/2010/main" w="9525">
+                    <a14:hiddenLine xmlns:a14="http://schemas.microsoft.com/office/drawing/2010/main" xmlns="" w="9525">
                       <a:solidFill>
                         <a:srgbClr val="000000"/>
                       </a:solidFill>
@@ -30570,7 +30570,7 @@
                 <a:gridCol w="11225057">
                   <a:extLst>
                     <a:ext uri="{9D8B030D-6E8A-4147-A177-3AD203B41FA5}">
-                      <a16:colId xmlns="" xmlns:a16="http://schemas.microsoft.com/office/drawing/2014/main" val="1253488153"/>
+                      <a16:colId xmlns:a16="http://schemas.microsoft.com/office/drawing/2014/main" xmlns="" val="1253488153"/>
                     </a:ext>
                   </a:extLst>
                 </a:gridCol>
@@ -30592,7 +30592,7 @@
                 </a:tc>
                 <a:extLst>
                   <a:ext uri="{0D108BD9-81ED-4DB2-BD59-A6C34878D82A}">
-                    <a16:rowId xmlns="" xmlns:a16="http://schemas.microsoft.com/office/drawing/2014/main" val="829859176"/>
+                    <a16:rowId xmlns:a16="http://schemas.microsoft.com/office/drawing/2014/main" xmlns="" val="829859176"/>
                   </a:ext>
                 </a:extLst>
               </a:tr>
@@ -30612,7 +30612,7 @@
                 </a:tc>
                 <a:extLst>
                   <a:ext uri="{0D108BD9-81ED-4DB2-BD59-A6C34878D82A}">
-                    <a16:rowId xmlns="" xmlns:a16="http://schemas.microsoft.com/office/drawing/2014/main" val="1946132611"/>
+                    <a16:rowId xmlns:a16="http://schemas.microsoft.com/office/drawing/2014/main" xmlns="" val="1946132611"/>
                   </a:ext>
                 </a:extLst>
               </a:tr>
@@ -30649,7 +30649,7 @@
                 </a:tc>
                 <a:extLst>
                   <a:ext uri="{0D108BD9-81ED-4DB2-BD59-A6C34878D82A}">
-                    <a16:rowId xmlns="" xmlns:a16="http://schemas.microsoft.com/office/drawing/2014/main" val="3204002662"/>
+                    <a16:rowId xmlns:a16="http://schemas.microsoft.com/office/drawing/2014/main" xmlns="" val="3204002662"/>
                   </a:ext>
                 </a:extLst>
               </a:tr>
@@ -30686,7 +30686,7 @@
                 </a:tc>
                 <a:extLst>
                   <a:ext uri="{0D108BD9-81ED-4DB2-BD59-A6C34878D82A}">
-                    <a16:rowId xmlns="" xmlns:a16="http://schemas.microsoft.com/office/drawing/2014/main" val="4266278162"/>
+                    <a16:rowId xmlns:a16="http://schemas.microsoft.com/office/drawing/2014/main" xmlns="" val="4266278162"/>
                   </a:ext>
                 </a:extLst>
               </a:tr>
@@ -30723,11 +30723,7 @@
                       </a:r>
                       <a:r>
                         <a:rPr lang="en-US" sz="2400" smtClean="0"/>
-                        <a:t>365 </a:t>
-                      </a:r>
-                      <a:r>
-                        <a:rPr lang="en-US" sz="2400" smtClean="0"/>
-                        <a:t>APIs</a:t>
+                        <a:t>365 APIs</a:t>
                       </a:r>
                       <a:endParaRPr lang="en-US" sz="2400" dirty="0" smtClean="0"/>
                     </a:p>
@@ -33533,7 +33529,19 @@
           <a:p>
             <a:r>
               <a:rPr lang="en-US" dirty="0" smtClean="0"/>
-              <a:t>Windows Azure Environment</a:t>
+              <a:t> </a:t>
+            </a:r>
+            <a:r>
+              <a:rPr lang="en-US" dirty="0" smtClean="0"/>
+              <a:t>Microsoft </a:t>
+            </a:r>
+            <a:r>
+              <a:rPr lang="en-US" dirty="0" smtClean="0"/>
+              <a:t>Azure </a:t>
+            </a:r>
+            <a:r>
+              <a:rPr lang="en-US" dirty="0" smtClean="0"/>
+              <a:t>Environment</a:t>
             </a:r>
             <a:endParaRPr lang="en-US" dirty="0"/>
           </a:p>
@@ -35552,7 +35560,11 @@
           <a:p>
             <a:r>
               <a:rPr lang="en-US" dirty="0" smtClean="0"/>
-              <a:t>Windows Azure Subscription</a:t>
+              <a:t>Microsoft Azure </a:t>
+            </a:r>
+            <a:r>
+              <a:rPr lang="en-US" dirty="0" smtClean="0"/>
+              <a:t>Subscription</a:t>
             </a:r>
           </a:p>
           <a:p>
@@ -35688,7 +35700,11 @@
           <a:p>
             <a:r>
               <a:rPr lang="en-US" dirty="0" smtClean="0"/>
-              <a:t>Windows Azure Subscription</a:t>
+              <a:t>Microsoft Azure </a:t>
+            </a:r>
+            <a:r>
+              <a:rPr lang="en-US" dirty="0" smtClean="0"/>
+              <a:t>Subscription</a:t>
             </a:r>
           </a:p>
           <a:p>
@@ -35824,7 +35840,11 @@
           <a:p>
             <a:r>
               <a:rPr lang="en-US" dirty="0" smtClean="0"/>
-              <a:t>Windows Azure Subscription</a:t>
+              <a:t>Microsoft Azure </a:t>
+            </a:r>
+            <a:r>
+              <a:rPr lang="en-US" dirty="0" smtClean="0"/>
+              <a:t>Subscription</a:t>
             </a:r>
           </a:p>
           <a:p>
@@ -36085,20 +36105,38 @@
           <a:p>
             <a:r>
               <a:rPr lang="en-US" dirty="0" smtClean="0"/>
-              <a:t>Sign up for Windows Azure subscription</a:t>
-            </a:r>
-          </a:p>
-          <a:p>
+              <a:t>Sign up for </a:t>
+            </a:r>
             <a:r>
               <a:rPr lang="en-US" dirty="0" smtClean="0"/>
-              <a:t>Link Office 365 AAD to Windows Azure</a:t>
-            </a:r>
-          </a:p>
-          <a:p>
+              <a:t>Microsoft Azure </a:t>
+            </a:r>
             <a:r>
               <a:rPr lang="en-US" dirty="0" smtClean="0"/>
-              <a:t>Make Office 365 user administrator in Windows Azure</a:t>
-            </a:r>
+              <a:t>subscription</a:t>
+            </a:r>
+          </a:p>
+          <a:p>
+            <a:r>
+              <a:rPr lang="en-US" dirty="0" smtClean="0"/>
+              <a:t>Link Office 365 AAD to </a:t>
+            </a:r>
+            <a:r>
+              <a:rPr lang="en-US" dirty="0" smtClean="0"/>
+              <a:t>Microsoft Azure</a:t>
+            </a:r>
+            <a:endParaRPr lang="en-US" dirty="0" smtClean="0"/>
+          </a:p>
+          <a:p>
+            <a:r>
+              <a:rPr lang="en-US" dirty="0" smtClean="0"/>
+              <a:t>Make Office 365 user administrator in </a:t>
+            </a:r>
+            <a:r>
+              <a:rPr lang="en-US" dirty="0" smtClean="0"/>
+              <a:t>Microsoft Azure</a:t>
+            </a:r>
+            <a:endParaRPr lang="en-US" dirty="0" smtClean="0"/>
           </a:p>
           <a:p>
             <a:r>
@@ -36306,7 +36344,15 @@
           <a:p>
             <a:r>
               <a:rPr lang="en-US" dirty="0" smtClean="0"/>
-              <a:t>The Windows Azure Environment</a:t>
+              <a:t>The </a:t>
+            </a:r>
+            <a:r>
+              <a:rPr lang="en-US" dirty="0" smtClean="0"/>
+              <a:t>Microsoft Azure </a:t>
+            </a:r>
+            <a:r>
+              <a:rPr lang="en-US" dirty="0" smtClean="0"/>
+              <a:t>Environment</a:t>
             </a:r>
           </a:p>
           <a:p>
@@ -38804,6 +38850,12 @@
 </file>
 
 <file path=customXml/item2.xml><?xml version="1.0" encoding="utf-8"?>
+<p:properties xmlns:p="http://schemas.microsoft.com/office/2006/metadata/properties" xmlns:xsi="http://www.w3.org/2001/XMLSchema-instance" xmlns:pc="http://schemas.microsoft.com/office/infopath/2007/PartnerControls">
+  <documentManagement/>
+</p:properties>
+</file>
+
+<file path=customXml/item3.xml><?xml version="1.0" encoding="utf-8"?>
 <ct:contentTypeSchema xmlns:ct="http://schemas.microsoft.com/office/2006/metadata/contentType" xmlns:ma="http://schemas.microsoft.com/office/2006/metadata/properties/metaAttributes" ct:_="" ma:_="" ma:contentTypeName="Document" ma:contentTypeID="0x010100A2E4C90AA7333249A7DBC8CC6F49919B" ma:contentTypeVersion="1" ma:contentTypeDescription="Create a new document." ma:contentTypeScope="" ma:versionID="e7b09f0f38d7ed30c7da14951e97abcc">
   <xsd:schema xmlns:xsd="http://www.w3.org/2001/XMLSchema" xmlns:xs="http://www.w3.org/2001/XMLSchema" xmlns:p="http://schemas.microsoft.com/office/2006/metadata/properties" xmlns:ns2="5fad15d0-477e-40da-a20d-40d4ca777cbd" targetNamespace="http://schemas.microsoft.com/office/2006/metadata/properties" ma:root="true" ma:fieldsID="0cee24db179c30c5ebec40b677cadf70" ns2:_="">
     <xsd:import namespace="5fad15d0-477e-40da-a20d-40d4ca777cbd"/>
@@ -38943,12 +38995,6 @@
 </ct:contentTypeSchema>
 </file>
 
-<file path=customXml/item3.xml><?xml version="1.0" encoding="utf-8"?>
-<p:properties xmlns:p="http://schemas.microsoft.com/office/2006/metadata/properties" xmlns:xsi="http://www.w3.org/2001/XMLSchema-instance" xmlns:pc="http://schemas.microsoft.com/office/infopath/2007/PartnerControls">
-  <documentManagement/>
-</p:properties>
-</file>
-
 <file path=customXml/itemProps1.xml><?xml version="1.0" encoding="utf-8"?>
 <ds:datastoreItem xmlns:ds="http://schemas.openxmlformats.org/officeDocument/2006/customXml" ds:itemID="{E1E0CE18-CA03-4891-9CD8-3448778E3D53}">
   <ds:schemaRefs>
@@ -38958,6 +39004,22 @@
 </file>
 
 <file path=customXml/itemProps2.xml><?xml version="1.0" encoding="utf-8"?>
+<ds:datastoreItem xmlns:ds="http://schemas.openxmlformats.org/officeDocument/2006/customXml" ds:itemID="{DA593625-DB14-4FB0-B5A9-3269FA9C120B}">
+  <ds:schemaRefs>
+    <ds:schemaRef ds:uri="http://purl.org/dc/elements/1.1/"/>
+    <ds:schemaRef ds:uri="http://www.w3.org/XML/1998/namespace"/>
+    <ds:schemaRef ds:uri="http://schemas.microsoft.com/office/2006/documentManagement/types"/>
+    <ds:schemaRef ds:uri="http://purl.org/dc/terms/"/>
+    <ds:schemaRef ds:uri="http://schemas.openxmlformats.org/package/2006/metadata/core-properties"/>
+    <ds:schemaRef ds:uri="http://schemas.microsoft.com/office/2006/metadata/properties"/>
+    <ds:schemaRef ds:uri="http://purl.org/dc/dcmitype/"/>
+    <ds:schemaRef ds:uri="http://schemas.microsoft.com/office/infopath/2007/PartnerControls"/>
+    <ds:schemaRef ds:uri="5fad15d0-477e-40da-a20d-40d4ca777cbd"/>
+  </ds:schemaRefs>
+</ds:datastoreItem>
+</file>
+
+<file path=customXml/itemProps3.xml><?xml version="1.0" encoding="utf-8"?>
 <ds:datastoreItem xmlns:ds="http://schemas.openxmlformats.org/officeDocument/2006/customXml" ds:itemID="{F17DCE38-6787-497B-B958-75817420EB1E}">
   <ds:schemaRefs>
     <ds:schemaRef ds:uri="http://schemas.microsoft.com/office/2006/metadata/contentType"/>
@@ -38973,20 +39035,4 @@
     <ds:schemaRef ds:uri="http://schemas.microsoft.com/internal/obd"/>
   </ds:schemaRefs>
 </ds:datastoreItem>
-</file>
-
-<file path=customXml/itemProps3.xml><?xml version="1.0" encoding="utf-8"?>
-<ds:datastoreItem xmlns:ds="http://schemas.openxmlformats.org/officeDocument/2006/customXml" ds:itemID="{DA593625-DB14-4FB0-B5A9-3269FA9C120B}">
-  <ds:schemaRefs>
-    <ds:schemaRef ds:uri="http://schemas.microsoft.com/office/2006/metadata/properties"/>
-    <ds:schemaRef ds:uri="http://purl.org/dc/dcmitype/"/>
-    <ds:schemaRef ds:uri="http://schemas.microsoft.com/office/2006/documentManagement/types"/>
-    <ds:schemaRef ds:uri="http://schemas.openxmlformats.org/package/2006/metadata/core-properties"/>
-    <ds:schemaRef ds:uri="http://purl.org/dc/elements/1.1/"/>
-    <ds:schemaRef ds:uri="http://purl.org/dc/terms/"/>
-    <ds:schemaRef ds:uri="http://schemas.microsoft.com/office/infopath/2007/PartnerControls"/>
-    <ds:schemaRef ds:uri="5fad15d0-477e-40da-a20d-40d4ca777cbd"/>
-    <ds:schemaRef ds:uri="http://www.w3.org/XML/1998/namespace"/>
-  </ds:schemaRefs>
-</ds:datastoreItem>
 </file>
</xml_diff>